<commit_message>
Update of final presentation fixes
</commit_message>
<xml_diff>
--- a/Project 4 Presentation.pptx
+++ b/Project 4 Presentation.pptx
@@ -14,23 +14,24 @@
     <p:sldId id="259" r:id="rId8"/>
     <p:sldId id="260" r:id="rId9"/>
     <p:sldId id="261" r:id="rId10"/>
+    <p:sldId id="262" r:id="rId11"/>
   </p:sldIdLst>
   <p:sldSz cy="5143500" cx="9144000"/>
   <p:notesSz cx="6858000" cy="9144000"/>
   <p:embeddedFontLst>
     <p:embeddedFont>
       <p:font typeface="Roboto"/>
-      <p:regular r:id="rId11"/>
-      <p:bold r:id="rId12"/>
-      <p:italic r:id="rId13"/>
-      <p:boldItalic r:id="rId14"/>
+      <p:regular r:id="rId12"/>
+      <p:bold r:id="rId13"/>
+      <p:italic r:id="rId14"/>
+      <p:boldItalic r:id="rId15"/>
     </p:embeddedFont>
     <p:embeddedFont>
       <p:font typeface="Merriweather"/>
-      <p:regular r:id="rId15"/>
-      <p:bold r:id="rId16"/>
-      <p:italic r:id="rId17"/>
-      <p:boldItalic r:id="rId18"/>
+      <p:regular r:id="rId16"/>
+      <p:bold r:id="rId17"/>
+      <p:italic r:id="rId18"/>
+      <p:boldItalic r:id="rId19"/>
     </p:embeddedFont>
   </p:embeddedFontLst>
   <p:defaultTextStyle>
@@ -1232,6 +1233,104 @@
       <p:sp>
         <p:nvSpPr>
           <p:cNvPr id="92" name="Shape 92"/>
+          <p:cNvSpPr txBox="1"/>
+          <p:nvPr>
+            <p:ph idx="1" type="body"/>
+          </p:nvPr>
+        </p:nvSpPr>
+        <p:spPr>
+          <a:xfrm>
+            <a:off x="685800" y="4343400"/>
+            <a:ext cx="5486400" cy="4114800"/>
+          </a:xfrm>
+          <a:prstGeom prst="rect">
+            <a:avLst/>
+          </a:prstGeom>
+        </p:spPr>
+        <p:txBody>
+          <a:bodyPr anchorCtr="0" anchor="t" bIns="91425" lIns="91425" spcFirstLastPara="1" rIns="91425" wrap="square" tIns="91425">
+            <a:noAutofit/>
+          </a:bodyPr>
+          <a:lstStyle/>
+          <a:p>
+            <a:pPr indent="0" lvl="0" marL="0">
+              <a:spcBef>
+                <a:spcPts val="0"/>
+              </a:spcBef>
+              <a:spcAft>
+                <a:spcPts val="0"/>
+              </a:spcAft>
+              <a:buNone/>
+            </a:pPr>
+            <a:r>
+              <a:t/>
+            </a:r>
+            <a:endParaRPr/>
+          </a:p>
+        </p:txBody>
+      </p:sp>
+    </p:spTree>
+  </p:cSld>
+  <p:clrMapOvr>
+    <a:masterClrMapping/>
+  </p:clrMapOvr>
+</p:notes>
+</file>
+
+<file path=ppt/notesSlides/notesSlide7.xml><?xml version="1.0" encoding="utf-8"?>
+<p:notes xmlns:a="http://schemas.openxmlformats.org/drawingml/2006/main" xmlns:r="http://schemas.openxmlformats.org/officeDocument/2006/relationships" xmlns:mc="http://schemas.openxmlformats.org/markup-compatibility/2006" xmlns:mv="urn:schemas-microsoft-com:mac:vml" xmlns:p="http://schemas.openxmlformats.org/presentationml/2006/main" xmlns:c="http://schemas.openxmlformats.org/drawingml/2006/chart" xmlns:dgm="http://schemas.openxmlformats.org/drawingml/2006/diagram" xmlns:o="urn:schemas-microsoft-com:office:office" xmlns:v="urn:schemas-microsoft-com:vml" xmlns:pvml="urn:schemas-microsoft-com:office:powerpoint" xmlns:com="http://schemas.openxmlformats.org/drawingml/2006/compatibility" xmlns:p14="http://schemas.microsoft.com/office/powerpoint/2010/main" xmlns:p15="http://schemas.microsoft.com/office/powerpoint/2012/main" showMasterPhAnim="0" showMasterSp="0">
+  <p:cSld>
+    <p:spTree>
+      <p:nvGrpSpPr>
+        <p:cNvPr id="96" name="Shape 96"/>
+        <p:cNvGrpSpPr/>
+        <p:nvPr/>
+      </p:nvGrpSpPr>
+      <p:grpSpPr>
+        <a:xfrm>
+          <a:off x="0" y="0"/>
+          <a:ext cx="0" cy="0"/>
+          <a:chOff x="0" y="0"/>
+          <a:chExt cx="0" cy="0"/>
+        </a:xfrm>
+      </p:grpSpPr>
+      <p:sp>
+        <p:nvSpPr>
+          <p:cNvPr id="97" name="Shape 97"/>
+          <p:cNvSpPr/>
+          <p:nvPr>
+            <p:ph idx="2" type="sldImg"/>
+          </p:nvPr>
+        </p:nvSpPr>
+        <p:spPr>
+          <a:xfrm>
+            <a:off x="381300" y="685800"/>
+            <a:ext cx="6096000" cy="3429000"/>
+          </a:xfrm>
+          <a:custGeom>
+            <a:pathLst>
+              <a:path extrusionOk="0" h="120000" w="120000">
+                <a:moveTo>
+                  <a:pt x="0" y="0"/>
+                </a:moveTo>
+                <a:lnTo>
+                  <a:pt x="120000" y="0"/>
+                </a:lnTo>
+                <a:lnTo>
+                  <a:pt x="120000" y="120000"/>
+                </a:lnTo>
+                <a:lnTo>
+                  <a:pt x="0" y="120000"/>
+                </a:lnTo>
+                <a:close/>
+              </a:path>
+            </a:pathLst>
+          </a:custGeom>
+        </p:spPr>
+      </p:sp>
+      <p:sp>
+        <p:nvSpPr>
+          <p:cNvPr id="98" name="Shape 98"/>
           <p:cNvSpPr txBox="1"/>
           <p:nvPr>
             <p:ph idx="1" type="body"/>
@@ -7684,7 +7783,7 @@
         <p:spPr>
           <a:xfrm>
             <a:off x="311725" y="500925"/>
-            <a:ext cx="3706500" cy="2508900"/>
+            <a:ext cx="3706500" cy="952200"/>
           </a:xfrm>
           <a:prstGeom prst="rect">
             <a:avLst/>
@@ -7696,7 +7795,7 @@
           </a:bodyPr>
           <a:lstStyle/>
           <a:p>
-            <a:pPr indent="0" lvl="0" marL="0" rtl="0" algn="ctr">
+            <a:pPr indent="0" lvl="0" marL="0" algn="ctr">
               <a:spcBef>
                 <a:spcPts val="0"/>
               </a:spcBef>
@@ -7707,23 +7806,7 @@
             </a:pPr>
             <a:r>
               <a:rPr lang="en"/>
-              <a:t>What is a Stream?</a:t>
-            </a:r>
-            <a:endParaRPr/>
-          </a:p>
-          <a:p>
-            <a:pPr indent="0" lvl="0" marL="0" algn="ctr">
-              <a:spcBef>
-                <a:spcPts val="0"/>
-              </a:spcBef>
-              <a:spcAft>
-                <a:spcPts val="0"/>
-              </a:spcAft>
-              <a:buNone/>
-            </a:pPr>
-            <a:r>
-              <a:rPr lang="en"/>
-              <a:t>(Main Attributes)</a:t>
+              <a:t>How to implement the Streams API</a:t>
             </a:r>
             <a:endParaRPr/>
           </a:p>
@@ -7764,7 +7847,7 @@
             </a:pPr>
             <a:r>
               <a:rPr lang="en" sz="1600"/>
-              <a:t>Sequence of objects from a source that supports aggregate operations.</a:t>
+              <a:t>Import just like any other Java package.</a:t>
             </a:r>
             <a:endParaRPr sz="1600"/>
           </a:p>
@@ -7781,7 +7864,7 @@
             </a:pPr>
             <a:r>
               <a:rPr lang="en" sz="1600"/>
-              <a:t>Takes Collections, Arrays, and I/O resources as input (Source). </a:t>
+              <a:t>“import java.util.stream.*;”</a:t>
             </a:r>
             <a:endParaRPr sz="1600"/>
           </a:p>
@@ -7798,7 +7881,7 @@
             </a:pPr>
             <a:r>
               <a:rPr lang="en" sz="1600"/>
-              <a:t>Supports operations such as, filter, find, match, map, limit, sorted, etc. </a:t>
+              <a:t>Generate a stream using .stream() or .parallelstream() to go through data from a specified source (arrays, collections, I/O,  etc.).</a:t>
             </a:r>
             <a:endParaRPr sz="1600"/>
           </a:p>
@@ -7815,24 +7898,7 @@
             </a:pPr>
             <a:r>
               <a:rPr lang="en" sz="1600"/>
-              <a:t>Pipelining operations are used to take the input, process it, and return output usually ending with a .collect() method (marks end of stream).</a:t>
-            </a:r>
-            <a:endParaRPr sz="1600"/>
-          </a:p>
-          <a:p>
-            <a:pPr indent="-330200" lvl="0" marL="457200">
-              <a:spcBef>
-                <a:spcPts val="0"/>
-              </a:spcBef>
-              <a:spcAft>
-                <a:spcPts val="0"/>
-              </a:spcAft>
-              <a:buSzPts val="1600"/>
-              <a:buChar char="❖"/>
-            </a:pPr>
-            <a:r>
-              <a:rPr lang="en" sz="1600"/>
-              <a:t>Automatic iterations done internally over the source vs. Collections requirement for explicit iteration.</a:t>
+              <a:t>Create queries to extract desired data from the source. </a:t>
             </a:r>
             <a:endParaRPr sz="1600"/>
           </a:p>
@@ -7886,7 +7952,7 @@
           </a:bodyPr>
           <a:lstStyle/>
           <a:p>
-            <a:pPr indent="0" lvl="0" marL="0" algn="ctr">
+            <a:pPr indent="0" lvl="0" marL="0" rtl="0" algn="ctr">
               <a:spcBef>
                 <a:spcPts val="0"/>
               </a:spcBef>
@@ -7897,7 +7963,23 @@
             </a:pPr>
             <a:r>
               <a:rPr lang="en"/>
-              <a:t>Stream Operations</a:t>
+              <a:t>What is a Stream?</a:t>
+            </a:r>
+            <a:endParaRPr/>
+          </a:p>
+          <a:p>
+            <a:pPr indent="0" lvl="0" marL="0" algn="ctr">
+              <a:spcBef>
+                <a:spcPts val="0"/>
+              </a:spcBef>
+              <a:spcAft>
+                <a:spcPts val="0"/>
+              </a:spcAft>
+              <a:buNone/>
+            </a:pPr>
+            <a:r>
+              <a:rPr lang="en"/>
+              <a:t>(Main Attributes)</a:t>
             </a:r>
             <a:endParaRPr/>
           </a:p>
@@ -7914,7 +7996,7 @@
         <p:spPr>
           <a:xfrm>
             <a:off x="4644675" y="500925"/>
-            <a:ext cx="4166400" cy="4226400"/>
+            <a:ext cx="4166400" cy="4098600"/>
           </a:xfrm>
           <a:prstGeom prst="rect">
             <a:avLst/>
@@ -7938,49 +8020,12 @@
             </a:pPr>
             <a:r>
               <a:rPr lang="en" sz="1600"/>
-              <a:t>Two kinds of Stream Operations</a:t>
+              <a:t>Sequence of objects from a source that supports aggregate operations.</a:t>
             </a:r>
             <a:endParaRPr sz="1600"/>
           </a:p>
           <a:p>
-            <a:pPr indent="-330200" lvl="1" marL="914400" rtl="0">
-              <a:spcBef>
-                <a:spcPts val="0"/>
-              </a:spcBef>
-              <a:spcAft>
-                <a:spcPts val="0"/>
-              </a:spcAft>
-              <a:buSzPts val="1600"/>
-              <a:buChar char="➢"/>
-            </a:pPr>
-            <a:r>
-              <a:rPr lang="en" sz="1600"/>
-              <a:t>Intermediate</a:t>
-            </a:r>
-            <a:endParaRPr sz="1600"/>
-          </a:p>
-          <a:p>
-            <a:pPr indent="-330200" lvl="1" marL="914400" rtl="0">
-              <a:spcBef>
-                <a:spcPts val="0"/>
-              </a:spcBef>
-              <a:spcAft>
-                <a:spcPts val="0"/>
-              </a:spcAft>
-              <a:buSzPts val="1600"/>
-              <a:buChar char="➢"/>
-            </a:pPr>
-            <a:r>
-              <a:rPr lang="en" sz="1600"/>
-              <a:t>Terminal</a:t>
-            </a:r>
-            <a:endParaRPr sz="1600"/>
-          </a:p>
-          <a:p>
-            <a:pPr indent="-330200" lvl="0" marL="457200" marR="0" rtl="0" algn="l">
-              <a:lnSpc>
-                <a:spcPct val="115000"/>
-              </a:lnSpc>
+            <a:pPr indent="-330200" lvl="0" marL="457200" rtl="0">
               <a:spcBef>
                 <a:spcPts val="0"/>
               </a:spcBef>
@@ -7992,66 +8037,7 @@
             </a:pPr>
             <a:r>
               <a:rPr lang="en" sz="1600"/>
-              <a:t>Intermediate</a:t>
-            </a:r>
-            <a:endParaRPr sz="1600"/>
-          </a:p>
-          <a:p>
-            <a:pPr indent="-330200" lvl="1" marL="914400" rtl="0">
-              <a:spcBef>
-                <a:spcPts val="0"/>
-              </a:spcBef>
-              <a:spcAft>
-                <a:spcPts val="0"/>
-              </a:spcAft>
-              <a:buSzPts val="1600"/>
-              <a:buChar char="➢"/>
-            </a:pPr>
-            <a:r>
-              <a:rPr lang="en" sz="1600"/>
-              <a:t>Returns a stream.</a:t>
-            </a:r>
-            <a:endParaRPr sz="1600"/>
-          </a:p>
-          <a:p>
-            <a:pPr indent="-330200" lvl="1" marL="914400" rtl="0">
-              <a:spcBef>
-                <a:spcPts val="0"/>
-              </a:spcBef>
-              <a:spcAft>
-                <a:spcPts val="0"/>
-              </a:spcAft>
-              <a:buSzPts val="1600"/>
-              <a:buChar char="➢"/>
-            </a:pPr>
-            <a:r>
-              <a:rPr lang="en" sz="1600"/>
-              <a:t>Can chain multiple operations together without a </a:t>
-            </a:r>
-            <a:r>
-              <a:rPr lang="en" sz="1600"/>
-              <a:t>semicolon</a:t>
-            </a:r>
-            <a:r>
-              <a:rPr lang="en" sz="1600"/>
-              <a:t>.</a:t>
-            </a:r>
-            <a:endParaRPr sz="1600"/>
-          </a:p>
-          <a:p>
-            <a:pPr indent="-330200" lvl="1" marL="914400" rtl="0">
-              <a:spcBef>
-                <a:spcPts val="0"/>
-              </a:spcBef>
-              <a:spcAft>
-                <a:spcPts val="0"/>
-              </a:spcAft>
-              <a:buSzPts val="1600"/>
-              <a:buChar char="➢"/>
-            </a:pPr>
-            <a:r>
-              <a:rPr lang="en" sz="1600"/>
-              <a:t>i.e. Filter, map, and sorted.</a:t>
+              <a:t>Takes Collections, Arrays, and I/O resources as input (Source). </a:t>
             </a:r>
             <a:endParaRPr sz="1600"/>
           </a:p>
@@ -8068,58 +8054,7 @@
             </a:pPr>
             <a:r>
               <a:rPr lang="en" sz="1600"/>
-              <a:t>Terminal</a:t>
-            </a:r>
-            <a:endParaRPr sz="1600"/>
-          </a:p>
-          <a:p>
-            <a:pPr indent="-330200" lvl="1" marL="914400" rtl="0">
-              <a:spcBef>
-                <a:spcPts val="0"/>
-              </a:spcBef>
-              <a:spcAft>
-                <a:spcPts val="0"/>
-              </a:spcAft>
-              <a:buSzPts val="1600"/>
-              <a:buChar char="➢"/>
-            </a:pPr>
-            <a:r>
-              <a:rPr lang="en" sz="1600"/>
-              <a:t>Returns void, or a non-stream result.</a:t>
-            </a:r>
-            <a:endParaRPr sz="1600"/>
-          </a:p>
-          <a:p>
-            <a:pPr indent="-330200" lvl="1" marL="914400" rtl="0">
-              <a:spcBef>
-                <a:spcPts val="0"/>
-              </a:spcBef>
-              <a:spcAft>
-                <a:spcPts val="0"/>
-              </a:spcAft>
-              <a:buSzPts val="1600"/>
-              <a:buChar char="➢"/>
-            </a:pPr>
-            <a:r>
-              <a:rPr lang="en" sz="1600"/>
-              <a:t>Requires a semicolon.</a:t>
-            </a:r>
-            <a:endParaRPr sz="1600"/>
-          </a:p>
-          <a:p>
-            <a:pPr indent="-330200" lvl="1" marL="914400" rtl="0">
-              <a:spcBef>
-                <a:spcPts val="0"/>
-              </a:spcBef>
-              <a:spcAft>
-                <a:spcPts val="0"/>
-              </a:spcAft>
-              <a:buSzPts val="1600"/>
-              <a:buChar char="➢"/>
-            </a:pPr>
-            <a:r>
-              <a:rPr lang="en" sz="1600"/>
-              <a:t>I.e. forEach</a:t>
+              <a:t>Supports operations such as, filter, find, match, map, limit, sorted, etc. </a:t>
             </a:r>
             <a:endParaRPr sz="1600"/>
           </a:p>
@@ -8136,31 +8071,24 @@
             </a:pPr>
             <a:r>
               <a:rPr lang="en" sz="1600"/>
-              <a:t>Full list of all stream operations at </a:t>
-            </a:r>
-            <a:r>
-              <a:rPr lang="en" sz="1600" u="sng">
-                <a:solidFill>
-                  <a:schemeClr val="hlink"/>
-                </a:solidFill>
-                <a:hlinkClick r:id="rId3"/>
-              </a:rPr>
-              <a:t>Stream Javadoc</a:t>
+              <a:t>Pipelining operations are used to take the input, process it, and return output usually ending with a .collect() method (marks end of stream).</a:t>
             </a:r>
             <a:endParaRPr sz="1600"/>
           </a:p>
           <a:p>
-            <a:pPr indent="0" lvl="0" marL="0">
-              <a:spcBef>
-                <a:spcPts val="1600"/>
-              </a:spcBef>
-              <a:spcAft>
-                <a:spcPts val="1600"/>
-              </a:spcAft>
-              <a:buNone/>
+            <a:pPr indent="-330200" lvl="0" marL="457200">
+              <a:spcBef>
+                <a:spcPts val="0"/>
+              </a:spcBef>
+              <a:spcAft>
+                <a:spcPts val="0"/>
+              </a:spcAft>
+              <a:buSzPts val="1600"/>
+              <a:buChar char="❖"/>
             </a:pPr>
             <a:r>
-              <a:t/>
+              <a:rPr lang="en" sz="1600"/>
+              <a:t>Automatic iterations done internally over the source vs. Collections requirement for explicit iteration.</a:t>
             </a:r>
             <a:endParaRPr sz="1600"/>
           </a:p>
@@ -8214,7 +8142,7 @@
           </a:bodyPr>
           <a:lstStyle/>
           <a:p>
-            <a:pPr indent="0" lvl="0" marL="0" algn="ctr">
+            <a:pPr indent="0" lvl="0" marL="0">
               <a:spcBef>
                 <a:spcPts val="0"/>
               </a:spcBef>
@@ -8225,7 +8153,7 @@
             </a:pPr>
             <a:r>
               <a:rPr lang="en"/>
-              <a:t>Stream Operations cont. </a:t>
+              <a:t>Example</a:t>
             </a:r>
             <a:endParaRPr/>
           </a:p>
@@ -8242,7 +8170,7 @@
         <p:spPr>
           <a:xfrm>
             <a:off x="4644675" y="500925"/>
-            <a:ext cx="4166400" cy="4098600"/>
+            <a:ext cx="4166400" cy="4642500"/>
           </a:xfrm>
           <a:prstGeom prst="rect">
             <a:avLst/>
@@ -8254,89 +8182,199 @@
           </a:bodyPr>
           <a:lstStyle/>
           <a:p>
-            <a:pPr indent="-330200" lvl="0" marL="457200" rtl="0">
-              <a:spcBef>
-                <a:spcPts val="0"/>
-              </a:spcBef>
-              <a:spcAft>
-                <a:spcPts val="0"/>
-              </a:spcAft>
-              <a:buSzPts val="1600"/>
-              <a:buChar char="❖"/>
+            <a:pPr indent="0" lvl="0" marL="0">
+              <a:spcBef>
+                <a:spcPts val="0"/>
+              </a:spcBef>
+              <a:spcAft>
+                <a:spcPts val="0"/>
+              </a:spcAft>
+              <a:buNone/>
             </a:pPr>
             <a:r>
-              <a:rPr lang="en" sz="1600"/>
-              <a:t>Behavioral Parameters</a:t>
+              <a:rPr lang="en"/>
+              <a:t>	For Loop with streams</a:t>
             </a:r>
-            <a:endParaRPr sz="1600"/>
+            <a:endParaRPr/>
           </a:p>
           <a:p>
-            <a:pPr indent="-330200" lvl="1" marL="914400" rtl="0">
-              <a:spcBef>
-                <a:spcPts val="0"/>
-              </a:spcBef>
-              <a:spcAft>
-                <a:spcPts val="0"/>
-              </a:spcAft>
-              <a:buSzPts val="1600"/>
-              <a:buChar char="➢"/>
+            <a:pPr indent="0" lvl="0" marL="0">
+              <a:spcBef>
+                <a:spcPts val="1600"/>
+              </a:spcBef>
+              <a:spcAft>
+                <a:spcPts val="0"/>
+              </a:spcAft>
+              <a:buNone/>
             </a:pPr>
             <a:r>
-              <a:rPr lang="en" sz="1600"/>
-              <a:t>Stateless - Result doesn’t depend on state that might change on execution.</a:t>
+              <a:rPr lang="en"/>
+              <a:t>public </a:t>
             </a:r>
-            <a:endParaRPr sz="1600"/>
+            <a:r>
+              <a:rPr lang="en"/>
+              <a:t>static void replaceForLoop() {</a:t>
+            </a:r>
+            <a:endParaRPr/>
           </a:p>
           <a:p>
-            <a:pPr indent="-330200" lvl="1" marL="914400" rtl="0">
-              <a:spcBef>
-                <a:spcPts val="0"/>
-              </a:spcBef>
-              <a:spcAft>
-                <a:spcPts val="0"/>
-              </a:spcAft>
-              <a:buSzPts val="1600"/>
-              <a:buChar char="➢"/>
+            <a:pPr indent="0" lvl="0" marL="0">
+              <a:spcBef>
+                <a:spcPts val="1600"/>
+              </a:spcBef>
+              <a:spcAft>
+                <a:spcPts val="0"/>
+              </a:spcAft>
+              <a:buNone/>
             </a:pPr>
             <a:r>
-              <a:rPr lang="en" sz="1600"/>
-              <a:t>Non-interfering - Must not modify the source of the stream.</a:t>
+              <a:rPr lang="en"/>
+              <a:t>		IntStream.range(1, 10)//starts from 1</a:t>
             </a:r>
-            <a:endParaRPr sz="1600"/>
+            <a:endParaRPr/>
           </a:p>
           <a:p>
-            <a:pPr indent="-330200" lvl="0" marL="457200" rtl="0">
-              <a:spcBef>
-                <a:spcPts val="0"/>
-              </a:spcBef>
-              <a:spcAft>
-                <a:spcPts val="0"/>
-              </a:spcAft>
-              <a:buSzPts val="1600"/>
-              <a:buChar char="❖"/>
+            <a:pPr indent="0" lvl="0" marL="0">
+              <a:spcBef>
+                <a:spcPts val="1600"/>
+              </a:spcBef>
+              <a:spcAft>
+                <a:spcPts val="0"/>
+              </a:spcAft>
+              <a:buNone/>
             </a:pPr>
             <a:r>
-              <a:rPr lang="en" sz="1600"/>
-              <a:t>Streams should only be operated on once, ruling out possibility of a forked stream (same source, 2 pipelines).</a:t>
+              <a:rPr lang="en"/>
+              <a:t>		.forEach(System.out::println);</a:t>
             </a:r>
-            <a:endParaRPr sz="1600"/>
+            <a:endParaRPr/>
           </a:p>
           <a:p>
-            <a:pPr indent="-330200" lvl="0" marL="457200" rtl="0">
-              <a:spcBef>
-                <a:spcPts val="0"/>
-              </a:spcBef>
-              <a:spcAft>
-                <a:spcPts val="0"/>
-              </a:spcAft>
-              <a:buSzPts val="1600"/>
-              <a:buChar char="❖"/>
+            <a:pPr indent="0" lvl="0" marL="0">
+              <a:spcBef>
+                <a:spcPts val="1600"/>
+              </a:spcBef>
+              <a:spcAft>
+                <a:spcPts val="0"/>
+              </a:spcAft>
+              <a:buNone/>
             </a:pPr>
             <a:r>
-              <a:rPr lang="en" sz="1600"/>
-              <a:t>No need to close stream unless operating on an I/O source, i.e. Files.lines(Path, Charset).</a:t>
+              <a:rPr lang="en"/>
+              <a:t>		</a:t>
             </a:r>
-            <a:endParaRPr sz="1600"/>
+            <a:endParaRPr/>
+          </a:p>
+          <a:p>
+            <a:pPr indent="0" lvl="0" marL="0">
+              <a:spcBef>
+                <a:spcPts val="1600"/>
+              </a:spcBef>
+              <a:spcAft>
+                <a:spcPts val="0"/>
+              </a:spcAft>
+              <a:buNone/>
+            </a:pPr>
+            <a:r>
+              <a:rPr lang="en"/>
+              <a:t>	}  //Usual java forloop</a:t>
+            </a:r>
+            <a:endParaRPr/>
+          </a:p>
+          <a:p>
+            <a:pPr indent="0" lvl="0" marL="0">
+              <a:spcBef>
+                <a:spcPts val="1600"/>
+              </a:spcBef>
+              <a:spcAft>
+                <a:spcPts val="0"/>
+              </a:spcAft>
+              <a:buNone/>
+            </a:pPr>
+            <a:r>
+              <a:rPr lang="en"/>
+              <a:t>	public static void forLoop() {</a:t>
+            </a:r>
+            <a:endParaRPr/>
+          </a:p>
+          <a:p>
+            <a:pPr indent="0" lvl="0" marL="0">
+              <a:spcBef>
+                <a:spcPts val="1600"/>
+              </a:spcBef>
+              <a:spcAft>
+                <a:spcPts val="0"/>
+              </a:spcAft>
+              <a:buNone/>
+            </a:pPr>
+            <a:r>
+              <a:rPr lang="en"/>
+              <a:t>		for (int i = 0; i &lt; 10; i++) {</a:t>
+            </a:r>
+            <a:endParaRPr/>
+          </a:p>
+          <a:p>
+            <a:pPr indent="0" lvl="0" marL="0">
+              <a:spcBef>
+                <a:spcPts val="1600"/>
+              </a:spcBef>
+              <a:spcAft>
+                <a:spcPts val="0"/>
+              </a:spcAft>
+              <a:buNone/>
+            </a:pPr>
+            <a:r>
+              <a:rPr lang="en"/>
+              <a:t>			System.out.println(i);</a:t>
+            </a:r>
+            <a:endParaRPr/>
+          </a:p>
+          <a:p>
+            <a:pPr indent="0" lvl="0" marL="0">
+              <a:spcBef>
+                <a:spcPts val="1600"/>
+              </a:spcBef>
+              <a:spcAft>
+                <a:spcPts val="0"/>
+              </a:spcAft>
+              <a:buNone/>
+            </a:pPr>
+            <a:r>
+              <a:rPr lang="en"/>
+              <a:t>			}</a:t>
+            </a:r>
+            <a:endParaRPr/>
+          </a:p>
+          <a:p>
+            <a:pPr indent="0" lvl="0" marL="0">
+              <a:spcBef>
+                <a:spcPts val="1600"/>
+              </a:spcBef>
+              <a:spcAft>
+                <a:spcPts val="0"/>
+              </a:spcAft>
+              <a:buNone/>
+            </a:pPr>
+            <a:r>
+              <a:rPr lang="en"/>
+              <a:t>		}//end</a:t>
+            </a:r>
+            <a:endParaRPr/>
+          </a:p>
+          <a:p>
+            <a:pPr indent="0" lvl="0" marL="0">
+              <a:spcBef>
+                <a:spcPts val="1600"/>
+              </a:spcBef>
+              <a:spcAft>
+                <a:spcPts val="1600"/>
+              </a:spcAft>
+              <a:buNone/>
+            </a:pPr>
+            <a:r>
+              <a:t/>
+            </a:r>
+            <a:endParaRPr/>
           </a:p>
         </p:txBody>
       </p:sp>
@@ -8376,7 +8414,7 @@
         <p:spPr>
           <a:xfrm>
             <a:off x="311725" y="500925"/>
-            <a:ext cx="3706500" cy="952200"/>
+            <a:ext cx="3706500" cy="2508900"/>
           </a:xfrm>
           <a:prstGeom prst="rect">
             <a:avLst/>
@@ -8399,7 +8437,7 @@
             </a:pPr>
             <a:r>
               <a:rPr lang="en"/>
-              <a:t>How to implement the Streams API</a:t>
+              <a:t>Stream Operations</a:t>
             </a:r>
             <a:endParaRPr/>
           </a:p>
@@ -8408,6 +8446,334 @@
       <p:sp>
         <p:nvSpPr>
           <p:cNvPr id="95" name="Shape 95"/>
+          <p:cNvSpPr txBox="1"/>
+          <p:nvPr>
+            <p:ph idx="1" type="body"/>
+          </p:nvPr>
+        </p:nvSpPr>
+        <p:spPr>
+          <a:xfrm>
+            <a:off x="4644675" y="500925"/>
+            <a:ext cx="4166400" cy="4226400"/>
+          </a:xfrm>
+          <a:prstGeom prst="rect">
+            <a:avLst/>
+          </a:prstGeom>
+        </p:spPr>
+        <p:txBody>
+          <a:bodyPr anchorCtr="0" anchor="t" bIns="91425" lIns="91425" spcFirstLastPara="1" rIns="91425" wrap="square" tIns="91425">
+            <a:noAutofit/>
+          </a:bodyPr>
+          <a:lstStyle/>
+          <a:p>
+            <a:pPr indent="-330200" lvl="0" marL="457200" rtl="0">
+              <a:spcBef>
+                <a:spcPts val="0"/>
+              </a:spcBef>
+              <a:spcAft>
+                <a:spcPts val="0"/>
+              </a:spcAft>
+              <a:buSzPts val="1600"/>
+              <a:buChar char="❖"/>
+            </a:pPr>
+            <a:r>
+              <a:rPr lang="en" sz="1600"/>
+              <a:t>Two kinds of Stream Operations</a:t>
+            </a:r>
+            <a:endParaRPr sz="1600"/>
+          </a:p>
+          <a:p>
+            <a:pPr indent="-330200" lvl="1" marL="914400" rtl="0">
+              <a:spcBef>
+                <a:spcPts val="0"/>
+              </a:spcBef>
+              <a:spcAft>
+                <a:spcPts val="0"/>
+              </a:spcAft>
+              <a:buSzPts val="1600"/>
+              <a:buChar char="➢"/>
+            </a:pPr>
+            <a:r>
+              <a:rPr lang="en" sz="1600"/>
+              <a:t>Intermediate</a:t>
+            </a:r>
+            <a:endParaRPr sz="1600"/>
+          </a:p>
+          <a:p>
+            <a:pPr indent="-330200" lvl="1" marL="914400" rtl="0">
+              <a:spcBef>
+                <a:spcPts val="0"/>
+              </a:spcBef>
+              <a:spcAft>
+                <a:spcPts val="0"/>
+              </a:spcAft>
+              <a:buSzPts val="1600"/>
+              <a:buChar char="➢"/>
+            </a:pPr>
+            <a:r>
+              <a:rPr lang="en" sz="1600"/>
+              <a:t>Terminal</a:t>
+            </a:r>
+            <a:endParaRPr sz="1600"/>
+          </a:p>
+          <a:p>
+            <a:pPr indent="-330200" lvl="0" marL="457200" marR="0" rtl="0" algn="l">
+              <a:lnSpc>
+                <a:spcPct val="115000"/>
+              </a:lnSpc>
+              <a:spcBef>
+                <a:spcPts val="0"/>
+              </a:spcBef>
+              <a:spcAft>
+                <a:spcPts val="0"/>
+              </a:spcAft>
+              <a:buSzPts val="1600"/>
+              <a:buChar char="❖"/>
+            </a:pPr>
+            <a:r>
+              <a:rPr lang="en" sz="1600"/>
+              <a:t>Intermediate</a:t>
+            </a:r>
+            <a:endParaRPr sz="1600"/>
+          </a:p>
+          <a:p>
+            <a:pPr indent="-330200" lvl="1" marL="914400" rtl="0">
+              <a:spcBef>
+                <a:spcPts val="0"/>
+              </a:spcBef>
+              <a:spcAft>
+                <a:spcPts val="0"/>
+              </a:spcAft>
+              <a:buSzPts val="1600"/>
+              <a:buChar char="➢"/>
+            </a:pPr>
+            <a:r>
+              <a:rPr lang="en" sz="1600"/>
+              <a:t>Returns a stream.</a:t>
+            </a:r>
+            <a:endParaRPr sz="1600"/>
+          </a:p>
+          <a:p>
+            <a:pPr indent="-330200" lvl="1" marL="914400" rtl="0">
+              <a:spcBef>
+                <a:spcPts val="0"/>
+              </a:spcBef>
+              <a:spcAft>
+                <a:spcPts val="0"/>
+              </a:spcAft>
+              <a:buSzPts val="1600"/>
+              <a:buChar char="➢"/>
+            </a:pPr>
+            <a:r>
+              <a:rPr lang="en" sz="1600"/>
+              <a:t>Can chain multiple operations together without a </a:t>
+            </a:r>
+            <a:r>
+              <a:rPr lang="en" sz="1600"/>
+              <a:t>semicolon</a:t>
+            </a:r>
+            <a:r>
+              <a:rPr lang="en" sz="1600"/>
+              <a:t>.</a:t>
+            </a:r>
+            <a:endParaRPr sz="1600"/>
+          </a:p>
+          <a:p>
+            <a:pPr indent="-330200" lvl="1" marL="914400" rtl="0">
+              <a:spcBef>
+                <a:spcPts val="0"/>
+              </a:spcBef>
+              <a:spcAft>
+                <a:spcPts val="0"/>
+              </a:spcAft>
+              <a:buSzPts val="1600"/>
+              <a:buChar char="➢"/>
+            </a:pPr>
+            <a:r>
+              <a:rPr lang="en" sz="1600"/>
+              <a:t>i.e. Filter, map, and sorted.</a:t>
+            </a:r>
+            <a:endParaRPr sz="1600"/>
+          </a:p>
+          <a:p>
+            <a:pPr indent="-330200" lvl="0" marL="457200" rtl="0">
+              <a:spcBef>
+                <a:spcPts val="0"/>
+              </a:spcBef>
+              <a:spcAft>
+                <a:spcPts val="0"/>
+              </a:spcAft>
+              <a:buSzPts val="1600"/>
+              <a:buChar char="❖"/>
+            </a:pPr>
+            <a:r>
+              <a:rPr lang="en" sz="1600"/>
+              <a:t>Terminal</a:t>
+            </a:r>
+            <a:endParaRPr sz="1600"/>
+          </a:p>
+          <a:p>
+            <a:pPr indent="-330200" lvl="1" marL="914400" rtl="0">
+              <a:spcBef>
+                <a:spcPts val="0"/>
+              </a:spcBef>
+              <a:spcAft>
+                <a:spcPts val="0"/>
+              </a:spcAft>
+              <a:buSzPts val="1600"/>
+              <a:buChar char="➢"/>
+            </a:pPr>
+            <a:r>
+              <a:rPr lang="en" sz="1600"/>
+              <a:t>Returns void, or a non-stream result.</a:t>
+            </a:r>
+            <a:endParaRPr sz="1600"/>
+          </a:p>
+          <a:p>
+            <a:pPr indent="-330200" lvl="1" marL="914400" rtl="0">
+              <a:spcBef>
+                <a:spcPts val="0"/>
+              </a:spcBef>
+              <a:spcAft>
+                <a:spcPts val="0"/>
+              </a:spcAft>
+              <a:buSzPts val="1600"/>
+              <a:buChar char="➢"/>
+            </a:pPr>
+            <a:r>
+              <a:rPr lang="en" sz="1600"/>
+              <a:t>Requires a semicolon.</a:t>
+            </a:r>
+            <a:endParaRPr sz="1600"/>
+          </a:p>
+          <a:p>
+            <a:pPr indent="-330200" lvl="1" marL="914400" rtl="0">
+              <a:spcBef>
+                <a:spcPts val="0"/>
+              </a:spcBef>
+              <a:spcAft>
+                <a:spcPts val="0"/>
+              </a:spcAft>
+              <a:buSzPts val="1600"/>
+              <a:buChar char="➢"/>
+            </a:pPr>
+            <a:r>
+              <a:rPr lang="en" sz="1600"/>
+              <a:t>I.e. forEach</a:t>
+            </a:r>
+            <a:endParaRPr sz="1600"/>
+          </a:p>
+          <a:p>
+            <a:pPr indent="-330200" lvl="0" marL="457200" rtl="0">
+              <a:spcBef>
+                <a:spcPts val="0"/>
+              </a:spcBef>
+              <a:spcAft>
+                <a:spcPts val="0"/>
+              </a:spcAft>
+              <a:buSzPts val="1600"/>
+              <a:buChar char="❖"/>
+            </a:pPr>
+            <a:r>
+              <a:rPr lang="en" sz="1600"/>
+              <a:t>Full list of all stream operations at </a:t>
+            </a:r>
+            <a:r>
+              <a:rPr lang="en" sz="1600" u="sng">
+                <a:solidFill>
+                  <a:schemeClr val="hlink"/>
+                </a:solidFill>
+                <a:hlinkClick r:id="rId3"/>
+              </a:rPr>
+              <a:t>Stream Javadoc</a:t>
+            </a:r>
+            <a:endParaRPr sz="1600"/>
+          </a:p>
+          <a:p>
+            <a:pPr indent="0" lvl="0" marL="0">
+              <a:spcBef>
+                <a:spcPts val="1600"/>
+              </a:spcBef>
+              <a:spcAft>
+                <a:spcPts val="1600"/>
+              </a:spcAft>
+              <a:buNone/>
+            </a:pPr>
+            <a:r>
+              <a:t/>
+            </a:r>
+            <a:endParaRPr sz="1600"/>
+          </a:p>
+        </p:txBody>
+      </p:sp>
+    </p:spTree>
+  </p:cSld>
+  <p:clrMapOvr>
+    <a:masterClrMapping/>
+  </p:clrMapOvr>
+</p:sld>
+</file>
+
+<file path=ppt/slides/slide7.xml><?xml version="1.0" encoding="utf-8"?>
+<p:sld xmlns:a="http://schemas.openxmlformats.org/drawingml/2006/main" xmlns:r="http://schemas.openxmlformats.org/officeDocument/2006/relationships" xmlns:mc="http://schemas.openxmlformats.org/markup-compatibility/2006" xmlns:mv="urn:schemas-microsoft-com:mac:vml" xmlns:p="http://schemas.openxmlformats.org/presentationml/2006/main" xmlns:c="http://schemas.openxmlformats.org/drawingml/2006/chart" xmlns:dgm="http://schemas.openxmlformats.org/drawingml/2006/diagram" xmlns:o="urn:schemas-microsoft-com:office:office" xmlns:v="urn:schemas-microsoft-com:vml" xmlns:pvml="urn:schemas-microsoft-com:office:powerpoint" xmlns:com="http://schemas.openxmlformats.org/drawingml/2006/compatibility" xmlns:p14="http://schemas.microsoft.com/office/powerpoint/2010/main" xmlns:p15="http://schemas.microsoft.com/office/powerpoint/2012/main">
+  <p:cSld>
+    <p:spTree>
+      <p:nvGrpSpPr>
+        <p:cNvPr id="99" name="Shape 99"/>
+        <p:cNvGrpSpPr/>
+        <p:nvPr/>
+      </p:nvGrpSpPr>
+      <p:grpSpPr>
+        <a:xfrm>
+          <a:off x="0" y="0"/>
+          <a:ext cx="0" cy="0"/>
+          <a:chOff x="0" y="0"/>
+          <a:chExt cx="0" cy="0"/>
+        </a:xfrm>
+      </p:grpSpPr>
+      <p:sp>
+        <p:nvSpPr>
+          <p:cNvPr id="100" name="Shape 100"/>
+          <p:cNvSpPr txBox="1"/>
+          <p:nvPr>
+            <p:ph type="title"/>
+          </p:nvPr>
+        </p:nvSpPr>
+        <p:spPr>
+          <a:xfrm>
+            <a:off x="311725" y="500925"/>
+            <a:ext cx="3706500" cy="2508900"/>
+          </a:xfrm>
+          <a:prstGeom prst="rect">
+            <a:avLst/>
+          </a:prstGeom>
+        </p:spPr>
+        <p:txBody>
+          <a:bodyPr anchorCtr="0" anchor="t" bIns="91425" lIns="91425" spcFirstLastPara="1" rIns="91425" wrap="square" tIns="91425">
+            <a:noAutofit/>
+          </a:bodyPr>
+          <a:lstStyle/>
+          <a:p>
+            <a:pPr indent="0" lvl="0" marL="0" algn="ctr">
+              <a:spcBef>
+                <a:spcPts val="0"/>
+              </a:spcBef>
+              <a:spcAft>
+                <a:spcPts val="0"/>
+              </a:spcAft>
+              <a:buNone/>
+            </a:pPr>
+            <a:r>
+              <a:rPr lang="en"/>
+              <a:t>Stream Operations cont. </a:t>
+            </a:r>
+            <a:endParaRPr/>
+          </a:p>
+        </p:txBody>
+      </p:sp>
+      <p:sp>
+        <p:nvSpPr>
+          <p:cNvPr id="101" name="Shape 101"/>
           <p:cNvSpPr txBox="1"/>
           <p:nvPr>
             <p:ph idx="1" type="body"/>
@@ -8440,7 +8806,41 @@
             </a:pPr>
             <a:r>
               <a:rPr lang="en" sz="1600"/>
-              <a:t>Import just like any other Java package.</a:t>
+              <a:t>Behavioral Parameters</a:t>
+            </a:r>
+            <a:endParaRPr sz="1600"/>
+          </a:p>
+          <a:p>
+            <a:pPr indent="-330200" lvl="1" marL="914400" rtl="0">
+              <a:spcBef>
+                <a:spcPts val="0"/>
+              </a:spcBef>
+              <a:spcAft>
+                <a:spcPts val="0"/>
+              </a:spcAft>
+              <a:buSzPts val="1600"/>
+              <a:buChar char="➢"/>
+            </a:pPr>
+            <a:r>
+              <a:rPr lang="en" sz="1600"/>
+              <a:t>Stateless - Result doesn’t depend on state that might change on execution.</a:t>
+            </a:r>
+            <a:endParaRPr sz="1600"/>
+          </a:p>
+          <a:p>
+            <a:pPr indent="-330200" lvl="1" marL="914400" rtl="0">
+              <a:spcBef>
+                <a:spcPts val="0"/>
+              </a:spcBef>
+              <a:spcAft>
+                <a:spcPts val="0"/>
+              </a:spcAft>
+              <a:buSzPts val="1600"/>
+              <a:buChar char="➢"/>
+            </a:pPr>
+            <a:r>
+              <a:rPr lang="en" sz="1600"/>
+              <a:t>Non-interfering - Must not modify the source of the stream.</a:t>
             </a:r>
             <a:endParaRPr sz="1600"/>
           </a:p>
@@ -8457,7 +8857,7 @@
             </a:pPr>
             <a:r>
               <a:rPr lang="en" sz="1600"/>
-              <a:t>“import java.util.stream.*;”</a:t>
+              <a:t>Streams should only be operated on once, ruling out possibility of a forked stream (same source, 2 pipelines).</a:t>
             </a:r>
             <a:endParaRPr sz="1600"/>
           </a:p>
@@ -8474,24 +8874,7 @@
             </a:pPr>
             <a:r>
               <a:rPr lang="en" sz="1600"/>
-              <a:t>Generate a stream using .stream() or .parallelstream() to go through data from a specified source (arrays, collections, I/O,  etc.).</a:t>
-            </a:r>
-            <a:endParaRPr sz="1600"/>
-          </a:p>
-          <a:p>
-            <a:pPr indent="-330200" lvl="0" marL="457200" rtl="0">
-              <a:spcBef>
-                <a:spcPts val="0"/>
-              </a:spcBef>
-              <a:spcAft>
-                <a:spcPts val="0"/>
-              </a:spcAft>
-              <a:buSzPts val="1600"/>
-              <a:buChar char="❖"/>
-            </a:pPr>
-            <a:r>
-              <a:rPr lang="en" sz="1600"/>
-              <a:t>Create queries to extract desired data from the source. </a:t>
+              <a:t>No need to close stream unless operating on an I/O source, i.e. Files.lines(Path, Charset).</a:t>
             </a:r>
             <a:endParaRPr sz="1600"/>
           </a:p>
@@ -8506,6 +8889,285 @@
 </file>
 
 <file path=ppt/theme/theme1.xml><?xml version="1.0" encoding="utf-8"?>
+<a:theme xmlns:a="http://schemas.openxmlformats.org/drawingml/2006/main" xmlns:r="http://schemas.openxmlformats.org/officeDocument/2006/relationships" name="Paradigm">
+  <a:themeElements>
+    <a:clrScheme name="Paradigm">
+      <a:dk1>
+        <a:srgbClr val="31394D"/>
+      </a:dk1>
+      <a:lt1>
+        <a:srgbClr val="FFFFFF"/>
+      </a:lt1>
+      <a:dk2>
+        <a:srgbClr val="666666"/>
+      </a:dk2>
+      <a:lt2>
+        <a:srgbClr val="626B73"/>
+      </a:lt2>
+      <a:accent1>
+        <a:srgbClr val="002F4A"/>
+      </a:accent1>
+      <a:accent2>
+        <a:srgbClr val="D9C4B1"/>
+      </a:accent2>
+      <a:accent3>
+        <a:srgbClr val="EDE3DA"/>
+      </a:accent3>
+      <a:accent4>
+        <a:srgbClr val="B85741"/>
+      </a:accent4>
+      <a:accent5>
+        <a:srgbClr val="009384"/>
+      </a:accent5>
+      <a:accent6>
+        <a:srgbClr val="D0F6FF"/>
+      </a:accent6>
+      <a:hlink>
+        <a:srgbClr val="009384"/>
+      </a:hlink>
+      <a:folHlink>
+        <a:srgbClr val="009384"/>
+      </a:folHlink>
+    </a:clrScheme>
+    <a:fontScheme name="Office">
+      <a:majorFont>
+        <a:latin typeface="Arial"/>
+        <a:ea typeface=""/>
+        <a:cs typeface=""/>
+        <a:font script="Jpan" typeface="ＭＳ Ｐゴシック"/>
+        <a:font script="Hang" typeface="맑은 고딕"/>
+        <a:font script="Hans" typeface="宋体"/>
+        <a:font script="Hant" typeface="新細明體"/>
+        <a:font script="Arab" typeface="Times New Roman"/>
+        <a:font script="Hebr" typeface="Times New Roman"/>
+        <a:font script="Thai" typeface="Angsana New"/>
+        <a:font script="Ethi" typeface="Nyala"/>
+        <a:font script="Beng" typeface="Vrinda"/>
+        <a:font script="Gujr" typeface="Shruti"/>
+        <a:font script="Khmr" typeface="MoolBoran"/>
+        <a:font script="Knda" typeface="Tunga"/>
+        <a:font script="Guru" typeface="Raavi"/>
+        <a:font script="Cans" typeface="Euphemia"/>
+        <a:font script="Cher" typeface="Plantagenet Cherokee"/>
+        <a:font script="Yiii" typeface="Microsoft Yi Baiti"/>
+        <a:font script="Tibt" typeface="Microsoft Himalaya"/>
+        <a:font script="Thaa" typeface="MV Boli"/>
+        <a:font script="Deva" typeface="Mangal"/>
+        <a:font script="Telu" typeface="Gautami"/>
+        <a:font script="Taml" typeface="Latha"/>
+        <a:font script="Syrc" typeface="Estrangelo Edessa"/>
+        <a:font script="Orya" typeface="Kalinga"/>
+        <a:font script="Mlym" typeface="Kartika"/>
+        <a:font script="Laoo" typeface="DokChampa"/>
+        <a:font script="Sinh" typeface="Iskoola Pota"/>
+        <a:font script="Mong" typeface="Mongolian Baiti"/>
+        <a:font script="Viet" typeface="Times New Roman"/>
+        <a:font script="Uigh" typeface="Microsoft Uighur"/>
+        <a:font script="Geor" typeface="Sylfaen"/>
+      </a:majorFont>
+      <a:minorFont>
+        <a:latin typeface="Arial"/>
+        <a:ea typeface=""/>
+        <a:cs typeface=""/>
+        <a:font script="Jpan" typeface="ＭＳ Ｐゴシック"/>
+        <a:font script="Hang" typeface="맑은 고딕"/>
+        <a:font script="Hans" typeface="宋体"/>
+        <a:font script="Hant" typeface="新細明體"/>
+        <a:font script="Arab" typeface="Arial"/>
+        <a:font script="Hebr" typeface="Arial"/>
+        <a:font script="Thai" typeface="Cordia New"/>
+        <a:font script="Ethi" typeface="Nyala"/>
+        <a:font script="Beng" typeface="Vrinda"/>
+        <a:font script="Gujr" typeface="Shruti"/>
+        <a:font script="Khmr" typeface="DaunPenh"/>
+        <a:font script="Knda" typeface="Tunga"/>
+        <a:font script="Guru" typeface="Raavi"/>
+        <a:font script="Cans" typeface="Euphemia"/>
+        <a:font script="Cher" typeface="Plantagenet Cherokee"/>
+        <a:font script="Yiii" typeface="Microsoft Yi Baiti"/>
+        <a:font script="Tibt" typeface="Microsoft Himalaya"/>
+        <a:font script="Thaa" typeface="MV Boli"/>
+        <a:font script="Deva" typeface="Mangal"/>
+        <a:font script="Telu" typeface="Gautami"/>
+        <a:font script="Taml" typeface="Latha"/>
+        <a:font script="Syrc" typeface="Estrangelo Edessa"/>
+        <a:font script="Orya" typeface="Kalinga"/>
+        <a:font script="Mlym" typeface="Kartika"/>
+        <a:font script="Laoo" typeface="DokChampa"/>
+        <a:font script="Sinh" typeface="Iskoola Pota"/>
+        <a:font script="Mong" typeface="Mongolian Baiti"/>
+        <a:font script="Viet" typeface="Arial"/>
+        <a:font script="Uigh" typeface="Microsoft Uighur"/>
+        <a:font script="Geor" typeface="Sylfaen"/>
+      </a:minorFont>
+    </a:fontScheme>
+    <a:fmtScheme name="Office">
+      <a:fillStyleLst>
+        <a:solidFill>
+          <a:schemeClr val="phClr"/>
+        </a:solidFill>
+        <a:gradFill rotWithShape="1">
+          <a:gsLst>
+            <a:gs pos="0">
+              <a:schemeClr val="phClr">
+                <a:tint val="50000"/>
+                <a:satMod val="300000"/>
+              </a:schemeClr>
+            </a:gs>
+            <a:gs pos="35000">
+              <a:schemeClr val="phClr">
+                <a:tint val="37000"/>
+                <a:satMod val="300000"/>
+              </a:schemeClr>
+            </a:gs>
+            <a:gs pos="100000">
+              <a:schemeClr val="phClr">
+                <a:tint val="15000"/>
+                <a:satMod val="350000"/>
+              </a:schemeClr>
+            </a:gs>
+          </a:gsLst>
+          <a:lin ang="16200000" scaled="1"/>
+        </a:gradFill>
+        <a:gradFill rotWithShape="1">
+          <a:gsLst>
+            <a:gs pos="0">
+              <a:schemeClr val="phClr">
+                <a:tint val="100000"/>
+                <a:shade val="100000"/>
+                <a:satMod val="130000"/>
+              </a:schemeClr>
+            </a:gs>
+            <a:gs pos="100000">
+              <a:schemeClr val="phClr">
+                <a:tint val="50000"/>
+                <a:shade val="100000"/>
+                <a:satMod val="350000"/>
+              </a:schemeClr>
+            </a:gs>
+          </a:gsLst>
+          <a:lin ang="16200000" scaled="0"/>
+        </a:gradFill>
+      </a:fillStyleLst>
+      <a:lnStyleLst>
+        <a:ln w="9525" cap="flat" cmpd="sng" algn="ctr">
+          <a:solidFill>
+            <a:schemeClr val="phClr">
+              <a:shade val="95000"/>
+              <a:satMod val="105000"/>
+            </a:schemeClr>
+          </a:solidFill>
+          <a:prstDash val="solid"/>
+        </a:ln>
+        <a:ln w="25400" cap="flat" cmpd="sng" algn="ctr">
+          <a:solidFill>
+            <a:schemeClr val="phClr"/>
+          </a:solidFill>
+          <a:prstDash val="solid"/>
+        </a:ln>
+        <a:ln w="38100" cap="flat" cmpd="sng" algn="ctr">
+          <a:solidFill>
+            <a:schemeClr val="phClr"/>
+          </a:solidFill>
+          <a:prstDash val="solid"/>
+        </a:ln>
+      </a:lnStyleLst>
+      <a:effectStyleLst>
+        <a:effectStyle>
+          <a:effectLst>
+            <a:outerShdw blurRad="40000" dist="20000" dir="5400000" rotWithShape="0">
+              <a:srgbClr val="000000">
+                <a:alpha val="38000"/>
+              </a:srgbClr>
+            </a:outerShdw>
+          </a:effectLst>
+        </a:effectStyle>
+        <a:effectStyle>
+          <a:effectLst>
+            <a:outerShdw blurRad="40000" dist="23000" dir="5400000" rotWithShape="0">
+              <a:srgbClr val="000000">
+                <a:alpha val="35000"/>
+              </a:srgbClr>
+            </a:outerShdw>
+          </a:effectLst>
+        </a:effectStyle>
+        <a:effectStyle>
+          <a:effectLst>
+            <a:outerShdw blurRad="40000" dist="23000" dir="5400000" rotWithShape="0">
+              <a:srgbClr val="000000">
+                <a:alpha val="35000"/>
+              </a:srgbClr>
+            </a:outerShdw>
+          </a:effectLst>
+          <a:scene3d>
+            <a:camera prst="orthographicFront">
+              <a:rot lat="0" lon="0" rev="0"/>
+            </a:camera>
+            <a:lightRig rig="threePt" dir="t">
+              <a:rot lat="0" lon="0" rev="1200000"/>
+            </a:lightRig>
+          </a:scene3d>
+          <a:sp3d>
+            <a:bevelT w="63500" h="25400"/>
+          </a:sp3d>
+        </a:effectStyle>
+      </a:effectStyleLst>
+      <a:bgFillStyleLst>
+        <a:solidFill>
+          <a:schemeClr val="phClr"/>
+        </a:solidFill>
+        <a:gradFill rotWithShape="1">
+          <a:gsLst>
+            <a:gs pos="0">
+              <a:schemeClr val="phClr">
+                <a:tint val="40000"/>
+                <a:satMod val="350000"/>
+              </a:schemeClr>
+            </a:gs>
+            <a:gs pos="40000">
+              <a:schemeClr val="phClr">
+                <a:tint val="45000"/>
+                <a:shade val="99000"/>
+                <a:satMod val="350000"/>
+              </a:schemeClr>
+            </a:gs>
+            <a:gs pos="100000">
+              <a:schemeClr val="phClr">
+                <a:shade val="20000"/>
+                <a:satMod val="255000"/>
+              </a:schemeClr>
+            </a:gs>
+          </a:gsLst>
+          <a:path path="circle">
+            <a:fillToRect l="50000" t="-80000" r="50000" b="180000"/>
+          </a:path>
+        </a:gradFill>
+        <a:gradFill rotWithShape="1">
+          <a:gsLst>
+            <a:gs pos="0">
+              <a:schemeClr val="phClr">
+                <a:tint val="80000"/>
+                <a:satMod val="300000"/>
+              </a:schemeClr>
+            </a:gs>
+            <a:gs pos="100000">
+              <a:schemeClr val="phClr">
+                <a:shade val="30000"/>
+                <a:satMod val="200000"/>
+              </a:schemeClr>
+            </a:gs>
+          </a:gsLst>
+          <a:path path="circle">
+            <a:fillToRect l="50000" t="50000" r="50000" b="50000"/>
+          </a:path>
+        </a:gradFill>
+      </a:bgFillStyleLst>
+    </a:fmtScheme>
+  </a:themeElements>
+</a:theme>
+</file>
+
+<file path=ppt/theme/theme2.xml><?xml version="1.0" encoding="utf-8"?>
 <a:theme xmlns:a="http://schemas.openxmlformats.org/drawingml/2006/main" xmlns:r="http://schemas.openxmlformats.org/officeDocument/2006/relationships">
   <a:themeElements>
     <a:clrScheme name="Default">
@@ -8782,283 +9444,4 @@
     </a:fmtScheme>
   </a:themeElements>
 </a:theme>
-</file>
-
-<file path=ppt/theme/theme2.xml><?xml version="1.0" encoding="utf-8"?>
-<a:theme xmlns:a="http://schemas.openxmlformats.org/drawingml/2006/main" xmlns:r="http://schemas.openxmlformats.org/officeDocument/2006/relationships" name="Paradigm">
-  <a:themeElements>
-    <a:clrScheme name="Paradigm">
-      <a:dk1>
-        <a:srgbClr val="31394D"/>
-      </a:dk1>
-      <a:lt1>
-        <a:srgbClr val="FFFFFF"/>
-      </a:lt1>
-      <a:dk2>
-        <a:srgbClr val="666666"/>
-      </a:dk2>
-      <a:lt2>
-        <a:srgbClr val="626B73"/>
-      </a:lt2>
-      <a:accent1>
-        <a:srgbClr val="002F4A"/>
-      </a:accent1>
-      <a:accent2>
-        <a:srgbClr val="D9C4B1"/>
-      </a:accent2>
-      <a:accent3>
-        <a:srgbClr val="EDE3DA"/>
-      </a:accent3>
-      <a:accent4>
-        <a:srgbClr val="B85741"/>
-      </a:accent4>
-      <a:accent5>
-        <a:srgbClr val="009384"/>
-      </a:accent5>
-      <a:accent6>
-        <a:srgbClr val="D0F6FF"/>
-      </a:accent6>
-      <a:hlink>
-        <a:srgbClr val="009384"/>
-      </a:hlink>
-      <a:folHlink>
-        <a:srgbClr val="009384"/>
-      </a:folHlink>
-    </a:clrScheme>
-    <a:fontScheme name="Office">
-      <a:majorFont>
-        <a:latin typeface="Arial"/>
-        <a:ea typeface=""/>
-        <a:cs typeface=""/>
-        <a:font script="Jpan" typeface="ＭＳ Ｐゴシック"/>
-        <a:font script="Hang" typeface="맑은 고딕"/>
-        <a:font script="Hans" typeface="宋体"/>
-        <a:font script="Hant" typeface="新細明體"/>
-        <a:font script="Arab" typeface="Times New Roman"/>
-        <a:font script="Hebr" typeface="Times New Roman"/>
-        <a:font script="Thai" typeface="Angsana New"/>
-        <a:font script="Ethi" typeface="Nyala"/>
-        <a:font script="Beng" typeface="Vrinda"/>
-        <a:font script="Gujr" typeface="Shruti"/>
-        <a:font script="Khmr" typeface="MoolBoran"/>
-        <a:font script="Knda" typeface="Tunga"/>
-        <a:font script="Guru" typeface="Raavi"/>
-        <a:font script="Cans" typeface="Euphemia"/>
-        <a:font script="Cher" typeface="Plantagenet Cherokee"/>
-        <a:font script="Yiii" typeface="Microsoft Yi Baiti"/>
-        <a:font script="Tibt" typeface="Microsoft Himalaya"/>
-        <a:font script="Thaa" typeface="MV Boli"/>
-        <a:font script="Deva" typeface="Mangal"/>
-        <a:font script="Telu" typeface="Gautami"/>
-        <a:font script="Taml" typeface="Latha"/>
-        <a:font script="Syrc" typeface="Estrangelo Edessa"/>
-        <a:font script="Orya" typeface="Kalinga"/>
-        <a:font script="Mlym" typeface="Kartika"/>
-        <a:font script="Laoo" typeface="DokChampa"/>
-        <a:font script="Sinh" typeface="Iskoola Pota"/>
-        <a:font script="Mong" typeface="Mongolian Baiti"/>
-        <a:font script="Viet" typeface="Times New Roman"/>
-        <a:font script="Uigh" typeface="Microsoft Uighur"/>
-        <a:font script="Geor" typeface="Sylfaen"/>
-      </a:majorFont>
-      <a:minorFont>
-        <a:latin typeface="Arial"/>
-        <a:ea typeface=""/>
-        <a:cs typeface=""/>
-        <a:font script="Jpan" typeface="ＭＳ Ｐゴシック"/>
-        <a:font script="Hang" typeface="맑은 고딕"/>
-        <a:font script="Hans" typeface="宋体"/>
-        <a:font script="Hant" typeface="新細明體"/>
-        <a:font script="Arab" typeface="Arial"/>
-        <a:font script="Hebr" typeface="Arial"/>
-        <a:font script="Thai" typeface="Cordia New"/>
-        <a:font script="Ethi" typeface="Nyala"/>
-        <a:font script="Beng" typeface="Vrinda"/>
-        <a:font script="Gujr" typeface="Shruti"/>
-        <a:font script="Khmr" typeface="DaunPenh"/>
-        <a:font script="Knda" typeface="Tunga"/>
-        <a:font script="Guru" typeface="Raavi"/>
-        <a:font script="Cans" typeface="Euphemia"/>
-        <a:font script="Cher" typeface="Plantagenet Cherokee"/>
-        <a:font script="Yiii" typeface="Microsoft Yi Baiti"/>
-        <a:font script="Tibt" typeface="Microsoft Himalaya"/>
-        <a:font script="Thaa" typeface="MV Boli"/>
-        <a:font script="Deva" typeface="Mangal"/>
-        <a:font script="Telu" typeface="Gautami"/>
-        <a:font script="Taml" typeface="Latha"/>
-        <a:font script="Syrc" typeface="Estrangelo Edessa"/>
-        <a:font script="Orya" typeface="Kalinga"/>
-        <a:font script="Mlym" typeface="Kartika"/>
-        <a:font script="Laoo" typeface="DokChampa"/>
-        <a:font script="Sinh" typeface="Iskoola Pota"/>
-        <a:font script="Mong" typeface="Mongolian Baiti"/>
-        <a:font script="Viet" typeface="Arial"/>
-        <a:font script="Uigh" typeface="Microsoft Uighur"/>
-        <a:font script="Geor" typeface="Sylfaen"/>
-      </a:minorFont>
-    </a:fontScheme>
-    <a:fmtScheme name="Office">
-      <a:fillStyleLst>
-        <a:solidFill>
-          <a:schemeClr val="phClr"/>
-        </a:solidFill>
-        <a:gradFill rotWithShape="1">
-          <a:gsLst>
-            <a:gs pos="0">
-              <a:schemeClr val="phClr">
-                <a:tint val="50000"/>
-                <a:satMod val="300000"/>
-              </a:schemeClr>
-            </a:gs>
-            <a:gs pos="35000">
-              <a:schemeClr val="phClr">
-                <a:tint val="37000"/>
-                <a:satMod val="300000"/>
-              </a:schemeClr>
-            </a:gs>
-            <a:gs pos="100000">
-              <a:schemeClr val="phClr">
-                <a:tint val="15000"/>
-                <a:satMod val="350000"/>
-              </a:schemeClr>
-            </a:gs>
-          </a:gsLst>
-          <a:lin ang="16200000" scaled="1"/>
-        </a:gradFill>
-        <a:gradFill rotWithShape="1">
-          <a:gsLst>
-            <a:gs pos="0">
-              <a:schemeClr val="phClr">
-                <a:tint val="100000"/>
-                <a:shade val="100000"/>
-                <a:satMod val="130000"/>
-              </a:schemeClr>
-            </a:gs>
-            <a:gs pos="100000">
-              <a:schemeClr val="phClr">
-                <a:tint val="50000"/>
-                <a:shade val="100000"/>
-                <a:satMod val="350000"/>
-              </a:schemeClr>
-            </a:gs>
-          </a:gsLst>
-          <a:lin ang="16200000" scaled="0"/>
-        </a:gradFill>
-      </a:fillStyleLst>
-      <a:lnStyleLst>
-        <a:ln w="9525" cap="flat" cmpd="sng" algn="ctr">
-          <a:solidFill>
-            <a:schemeClr val="phClr">
-              <a:shade val="95000"/>
-              <a:satMod val="105000"/>
-            </a:schemeClr>
-          </a:solidFill>
-          <a:prstDash val="solid"/>
-        </a:ln>
-        <a:ln w="25400" cap="flat" cmpd="sng" algn="ctr">
-          <a:solidFill>
-            <a:schemeClr val="phClr"/>
-          </a:solidFill>
-          <a:prstDash val="solid"/>
-        </a:ln>
-        <a:ln w="38100" cap="flat" cmpd="sng" algn="ctr">
-          <a:solidFill>
-            <a:schemeClr val="phClr"/>
-          </a:solidFill>
-          <a:prstDash val="solid"/>
-        </a:ln>
-      </a:lnStyleLst>
-      <a:effectStyleLst>
-        <a:effectStyle>
-          <a:effectLst>
-            <a:outerShdw blurRad="40000" dist="20000" dir="5400000" rotWithShape="0">
-              <a:srgbClr val="000000">
-                <a:alpha val="38000"/>
-              </a:srgbClr>
-            </a:outerShdw>
-          </a:effectLst>
-        </a:effectStyle>
-        <a:effectStyle>
-          <a:effectLst>
-            <a:outerShdw blurRad="40000" dist="23000" dir="5400000" rotWithShape="0">
-              <a:srgbClr val="000000">
-                <a:alpha val="35000"/>
-              </a:srgbClr>
-            </a:outerShdw>
-          </a:effectLst>
-        </a:effectStyle>
-        <a:effectStyle>
-          <a:effectLst>
-            <a:outerShdw blurRad="40000" dist="23000" dir="5400000" rotWithShape="0">
-              <a:srgbClr val="000000">
-                <a:alpha val="35000"/>
-              </a:srgbClr>
-            </a:outerShdw>
-          </a:effectLst>
-          <a:scene3d>
-            <a:camera prst="orthographicFront">
-              <a:rot lat="0" lon="0" rev="0"/>
-            </a:camera>
-            <a:lightRig rig="threePt" dir="t">
-              <a:rot lat="0" lon="0" rev="1200000"/>
-            </a:lightRig>
-          </a:scene3d>
-          <a:sp3d>
-            <a:bevelT w="63500" h="25400"/>
-          </a:sp3d>
-        </a:effectStyle>
-      </a:effectStyleLst>
-      <a:bgFillStyleLst>
-        <a:solidFill>
-          <a:schemeClr val="phClr"/>
-        </a:solidFill>
-        <a:gradFill rotWithShape="1">
-          <a:gsLst>
-            <a:gs pos="0">
-              <a:schemeClr val="phClr">
-                <a:tint val="40000"/>
-                <a:satMod val="350000"/>
-              </a:schemeClr>
-            </a:gs>
-            <a:gs pos="40000">
-              <a:schemeClr val="phClr">
-                <a:tint val="45000"/>
-                <a:shade val="99000"/>
-                <a:satMod val="350000"/>
-              </a:schemeClr>
-            </a:gs>
-            <a:gs pos="100000">
-              <a:schemeClr val="phClr">
-                <a:shade val="20000"/>
-                <a:satMod val="255000"/>
-              </a:schemeClr>
-            </a:gs>
-          </a:gsLst>
-          <a:path path="circle">
-            <a:fillToRect l="50000" t="-80000" r="50000" b="180000"/>
-          </a:path>
-        </a:gradFill>
-        <a:gradFill rotWithShape="1">
-          <a:gsLst>
-            <a:gs pos="0">
-              <a:schemeClr val="phClr">
-                <a:tint val="80000"/>
-                <a:satMod val="300000"/>
-              </a:schemeClr>
-            </a:gs>
-            <a:gs pos="100000">
-              <a:schemeClr val="phClr">
-                <a:shade val="30000"/>
-                <a:satMod val="200000"/>
-              </a:schemeClr>
-            </a:gs>
-          </a:gsLst>
-          <a:path path="circle">
-            <a:fillToRect l="50000" t="50000" r="50000" b="50000"/>
-          </a:path>
-        </a:gradFill>
-      </a:bgFillStyleLst>
-    </a:fmtScheme>
-  </a:themeElements>
-</a:theme>
 </file>
</xml_diff>